<commit_message>
created class to hander workers. Need to test.
</commit_message>
<xml_diff>
--- a/proposal/presentation/midProject.pptx
+++ b/proposal/presentation/midProject.pptx
@@ -8,7 +8,7 @@
     <p:notesMasterId r:id="rId4"/>
   </p:notesMasterIdLst>
   <p:handoutMasterIdLst>
-    <p:handoutMasterId r:id="rId13"/>
+    <p:handoutMasterId r:id="rId14"/>
   </p:handoutMasterIdLst>
   <p:sldIdLst>
     <p:sldId id="256" r:id="rId3"/>
@@ -18,8 +18,9 @@
     <p:sldId id="259" r:id="rId8"/>
     <p:sldId id="260" r:id="rId9"/>
     <p:sldId id="265" r:id="rId10"/>
-    <p:sldId id="261" r:id="rId11"/>
-    <p:sldId id="263" r:id="rId12"/>
+    <p:sldId id="270" r:id="rId11"/>
+    <p:sldId id="261" r:id="rId12"/>
+    <p:sldId id="263" r:id="rId13"/>
   </p:sldIdLst>
   <p:sldSz cx="12192000" cy="6858000"/>
   <p:notesSz cx="7103745" cy="10234295"/>
@@ -2993,13 +2994,7 @@
               <a:rPr lang="en-US" altLang="en-US">
                 <a:sym typeface="+mn-ea"/>
               </a:rPr>
-              <a:t>Compresses - </a:t>
-            </a:r>
-            <a:r>
-              <a:rPr lang="en-US" altLang="en-US">
-                <a:sym typeface="+mn-ea"/>
-              </a:rPr>
-              <a:t>betweem my pc and a google compute engine VM</a:t>
+              <a:t>Compresses - betweem my pc and a google compute engine VM</a:t>
             </a:r>
             <a:endParaRPr lang="en-US" altLang="en-US">
               <a:sym typeface="+mn-ea"/>
@@ -3030,6 +3025,50 @@
 </file>
 
 <file path=ppt/notesSlides/notesSlide4.xml><?xml version="1.0" encoding="utf-8"?>
+<p:notes xmlns:a="http://schemas.openxmlformats.org/drawingml/2006/main" xmlns:r="http://schemas.openxmlformats.org/officeDocument/2006/relationships" xmlns:p="http://schemas.openxmlformats.org/presentationml/2006/main">
+  <p:cSld>
+    <p:spTree>
+      <p:nvGrpSpPr>
+        <p:cNvPr id="1" name=""/>
+        <p:cNvGrpSpPr/>
+        <p:nvPr/>
+      </p:nvGrpSpPr>
+      <p:grpSpPr/>
+      <p:sp>
+        <p:nvSpPr>
+          <p:cNvPr id="2" name="Slide Image Placeholder 1"/>
+          <p:cNvSpPr/>
+          <p:nvPr>
+            <p:ph type="sldImg" idx="2"/>
+          </p:nvPr>
+        </p:nvSpPr>
+        <p:spPr/>
+      </p:sp>
+      <p:sp>
+        <p:nvSpPr>
+          <p:cNvPr id="3" name="Text Placeholder 2"/>
+          <p:cNvSpPr/>
+          <p:nvPr>
+            <p:ph type="body" idx="3"/>
+          </p:nvPr>
+        </p:nvSpPr>
+        <p:spPr/>
+        <p:txBody>
+          <a:bodyPr/>
+          <a:p>
+            <a:endParaRPr lang="en-US"/>
+          </a:p>
+        </p:txBody>
+      </p:sp>
+    </p:spTree>
+  </p:cSld>
+  <p:clrMapOvr>
+    <a:masterClrMapping/>
+  </p:clrMapOvr>
+</p:notes>
+</file>
+
+<file path=ppt/notesSlides/notesSlide5.xml><?xml version="1.0" encoding="utf-8"?>
 <p:notes xmlns:a="http://schemas.openxmlformats.org/drawingml/2006/main" xmlns:r="http://schemas.openxmlformats.org/officeDocument/2006/relationships" xmlns:p="http://schemas.openxmlformats.org/presentationml/2006/main">
   <p:cSld>
     <p:spTree>
@@ -6051,13 +6090,13 @@
         </p:nvSpPr>
         <p:spPr>
           <a:xfrm>
-            <a:off x="1524000" y="6008370"/>
-            <a:ext cx="9144000" cy="576580"/>
+            <a:off x="1524000" y="6533515"/>
+            <a:ext cx="9144000" cy="287020"/>
           </a:xfrm>
         </p:spPr>
         <p:txBody>
           <a:bodyPr>
-            <a:normAutofit/>
+            <a:normAutofit fontScale="60000"/>
           </a:bodyPr>
           <a:p>
             <a:r>
@@ -6065,6 +6104,159 @@
               <a:t>Nachiket Patel</a:t>
             </a:r>
             <a:endParaRPr lang="en-US" altLang="en-US"/>
+          </a:p>
+        </p:txBody>
+      </p:sp>
+      <p:sp>
+        <p:nvSpPr>
+          <p:cNvPr id="4" name="Title 1"/>
+          <p:cNvSpPr>
+            <a:spLocks noGrp="true"/>
+          </p:cNvSpPr>
+          <p:nvPr/>
+        </p:nvSpPr>
+        <p:spPr>
+          <a:xfrm>
+            <a:off x="2955290" y="4730750"/>
+            <a:ext cx="6610985" cy="753110"/>
+          </a:xfrm>
+          <a:prstGeom prst="rect">
+            <a:avLst/>
+          </a:prstGeom>
+        </p:spPr>
+        <p:txBody>
+          <a:bodyPr vert="horz" lIns="91440" tIns="45720" rIns="91440" bIns="45720" rtlCol="0" anchor="b">
+            <a:normAutofit lnSpcReduction="10000"/>
+          </a:bodyPr>
+          <a:lstStyle>
+            <a:lvl1pPr algn="ctr" defTabSz="914400" rtl="0" eaLnBrk="1" latinLnBrk="0" hangingPunct="1">
+              <a:lnSpc>
+                <a:spcPct val="130000"/>
+              </a:lnSpc>
+              <a:spcBef>
+                <a:spcPct val="0"/>
+              </a:spcBef>
+              <a:buNone/>
+              <a:defRPr sz="6000" kern="1200">
+                <a:solidFill>
+                  <a:schemeClr val="tx1"/>
+                </a:solidFill>
+                <a:effectLst>
+                  <a:outerShdw blurRad="38100" dist="38100" dir="2700000" algn="tl">
+                    <a:srgbClr val="000000">
+                      <a:alpha val="43137"/>
+                    </a:srgbClr>
+                  </a:outerShdw>
+                </a:effectLst>
+                <a:latin typeface="+mj-lt"/>
+                <a:ea typeface="+mj-ea"/>
+                <a:cs typeface="+mj-cs"/>
+              </a:defRPr>
+            </a:lvl1pPr>
+          </a:lstStyle>
+          <a:p>
+            <a:r>
+              <a:rPr lang="" altLang="en-US" sz="3600">
+                <a:solidFill>
+                  <a:schemeClr val="tx1"/>
+                </a:solidFill>
+                <a:effectLst>
+                  <a:outerShdw blurRad="38100" dist="19050" dir="2700000" algn="tl" rotWithShape="0">
+                    <a:schemeClr val="dk1">
+                      <a:alpha val="40000"/>
+                    </a:schemeClr>
+                  </a:outerShdw>
+                </a:effectLst>
+                <a:latin typeface="+mn-lt"/>
+                <a:cs typeface="+mn-lt"/>
+              </a:rPr>
+              <a:t>Mid Review</a:t>
+            </a:r>
+            <a:endParaRPr lang="" altLang="en-US" sz="3600">
+              <a:solidFill>
+                <a:schemeClr val="tx1"/>
+              </a:solidFill>
+              <a:effectLst>
+                <a:outerShdw blurRad="38100" dist="19050" dir="2700000" algn="tl" rotWithShape="0">
+                  <a:schemeClr val="dk1">
+                    <a:alpha val="40000"/>
+                  </a:schemeClr>
+                </a:outerShdw>
+              </a:effectLst>
+              <a:latin typeface="+mn-lt"/>
+              <a:cs typeface="+mn-lt"/>
+            </a:endParaRPr>
+          </a:p>
+        </p:txBody>
+      </p:sp>
+    </p:spTree>
+  </p:cSld>
+  <p:clrMapOvr>
+    <a:masterClrMapping/>
+  </p:clrMapOvr>
+</p:sld>
+</file>
+
+<file path=ppt/slides/slide10.xml><?xml version="1.0" encoding="utf-8"?>
+<p:sld xmlns:a="http://schemas.openxmlformats.org/drawingml/2006/main" xmlns:r="http://schemas.openxmlformats.org/officeDocument/2006/relationships" xmlns:p="http://schemas.openxmlformats.org/presentationml/2006/main">
+  <p:cSld>
+    <p:spTree>
+      <p:nvGrpSpPr>
+        <p:cNvPr id="1" name=""/>
+        <p:cNvGrpSpPr/>
+        <p:nvPr/>
+      </p:nvGrpSpPr>
+      <p:grpSpPr/>
+      <p:sp>
+        <p:nvSpPr>
+          <p:cNvPr id="2" name="Title 1"/>
+          <p:cNvSpPr>
+            <a:spLocks noGrp="true"/>
+          </p:cNvSpPr>
+          <p:nvPr>
+            <p:ph type="title"/>
+          </p:nvPr>
+        </p:nvSpPr>
+        <p:spPr>
+          <a:xfrm>
+            <a:off x="4147185" y="2597150"/>
+            <a:ext cx="3752850" cy="1374140"/>
+          </a:xfrm>
+        </p:spPr>
+        <p:txBody>
+          <a:bodyPr/>
+          <a:p>
+            <a:r>
+              <a:rPr lang="en-US" altLang="en-US" sz="5400">
+                <a:solidFill>
+                  <a:schemeClr val="tx1"/>
+                </a:solidFill>
+                <a:effectLst>
+                  <a:outerShdw blurRad="38100" dist="19050" dir="2700000" algn="tl" rotWithShape="0">
+                    <a:schemeClr val="dk1">
+                      <a:alpha val="40000"/>
+                    </a:schemeClr>
+                  </a:outerShdw>
+                </a:effectLst>
+                <a:latin typeface="+mn-lt"/>
+                <a:cs typeface="+mn-lt"/>
+              </a:rPr>
+              <a:t>Questions</a:t>
+            </a:r>
+            <a:endParaRPr lang="en-US" altLang="en-US" sz="5400">
+              <a:solidFill>
+                <a:schemeClr val="tx1"/>
+              </a:solidFill>
+              <a:effectLst>
+                <a:outerShdw blurRad="38100" dist="19050" dir="2700000" algn="tl" rotWithShape="0">
+                  <a:schemeClr val="dk1">
+                    <a:alpha val="40000"/>
+                  </a:schemeClr>
+                </a:outerShdw>
+              </a:effectLst>
+              <a:latin typeface="+mn-lt"/>
+              <a:cs typeface="+mn-lt"/>
+            </a:endParaRPr>
           </a:p>
         </p:txBody>
       </p:sp>
@@ -6102,13 +6294,13 @@
           <a:p>
             <a:pPr algn="ctr"/>
             <a:r>
-              <a:rPr lang="" altLang="en-US" sz="4000">
+              <a:rPr lang="en-US" altLang="en-US" sz="4000">
                 <a:latin typeface="+mn-lt"/>
                 <a:cs typeface="+mn-lt"/>
               </a:rPr>
               <a:t>Recap</a:t>
             </a:r>
-            <a:endParaRPr lang="" altLang="en-US" sz="4000">
+            <a:endParaRPr lang="en-US" altLang="en-US" sz="4000">
               <a:latin typeface="+mn-lt"/>
               <a:cs typeface="+mn-lt"/>
             </a:endParaRPr>
@@ -6388,7 +6580,7 @@
               <a:rPr lang="en-US" altLang="en-US">
                 <a:sym typeface="+mn-ea"/>
               </a:rPr>
-              <a:t>Split the matrix multiplication into sub-tasks and offload to neighboring nodes</a:t>
+              <a:t>Dealing with subtask failures due to node failure</a:t>
             </a:r>
             <a:endParaRPr lang="en-US" altLang="en-US"/>
           </a:p>
@@ -6402,7 +6594,7 @@
               <a:rPr lang="en-US" altLang="en-US">
                 <a:sym typeface="+mn-ea"/>
               </a:rPr>
-              <a:t>Detect failed operations and re-offload</a:t>
+              <a:t>Balancing granularity task splitting with overhead of splitting</a:t>
             </a:r>
             <a:endParaRPr lang="en-US" altLang="en-US"/>
           </a:p>
@@ -6416,18 +6608,8 @@
               <a:rPr lang="en-US" altLang="en-US">
                 <a:sym typeface="+mn-ea"/>
               </a:rPr>
-              <a:t>Experiment with granularity of sub-tasks</a:t>
-            </a:r>
-            <a:endParaRPr lang="en-US" altLang="en-US">
-              <a:sym typeface="+mn-ea"/>
-            </a:endParaRPr>
-          </a:p>
-          <a:p>
-            <a:pPr lvl="0"/>
-            <a:endParaRPr lang="en-US" altLang="en-US"/>
-          </a:p>
-          <a:p>
-            <a:pPr lvl="0"/>
+              <a:t>Efficiently transporting matrix data across nodes</a:t>
+            </a:r>
             <a:endParaRPr lang="en-US" altLang="en-US"/>
           </a:p>
         </p:txBody>
@@ -6482,13 +6664,13 @@
           <a:p>
             <a:pPr algn="ctr"/>
             <a:r>
-              <a:rPr lang="" altLang="en-US" sz="3200">
+              <a:rPr lang="en-US" altLang="en-US" sz="3200">
                 <a:latin typeface="+mn-lt"/>
                 <a:cs typeface="+mn-lt"/>
               </a:rPr>
               <a:t>Objective</a:t>
             </a:r>
-            <a:endParaRPr lang="" altLang="en-US" sz="3200">
+            <a:endParaRPr lang="en-US" altLang="en-US" sz="3200">
               <a:latin typeface="+mn-lt"/>
               <a:cs typeface="+mn-lt"/>
             </a:endParaRPr>
@@ -6545,13 +6727,13 @@
           <a:p>
             <a:pPr algn="ctr"/>
             <a:r>
-              <a:rPr lang="" altLang="en-US" sz="3200">
+              <a:rPr lang="en-US" altLang="en-US" sz="3200">
                 <a:latin typeface="+mn-lt"/>
                 <a:cs typeface="+mn-lt"/>
               </a:rPr>
               <a:t>Challenges</a:t>
             </a:r>
-            <a:endParaRPr lang="" altLang="en-US" sz="3200">
+            <a:endParaRPr lang="en-US" altLang="en-US" sz="3200">
               <a:latin typeface="+mn-lt"/>
               <a:cs typeface="+mn-lt"/>
             </a:endParaRPr>
@@ -6591,13 +6773,13 @@
           <a:bodyPr/>
           <a:p>
             <a:r>
-              <a:rPr lang="" altLang="en-US" sz="4000">
+              <a:rPr lang="en-US" altLang="en-US" sz="4000">
                 <a:latin typeface="+mn-lt"/>
                 <a:cs typeface="+mn-lt"/>
               </a:rPr>
               <a:t>Selecting a language</a:t>
             </a:r>
-            <a:endParaRPr lang="" altLang="en-US" sz="4000">
+            <a:endParaRPr lang="en-US" altLang="en-US" sz="4000">
               <a:latin typeface="+mn-lt"/>
               <a:cs typeface="+mn-lt"/>
             </a:endParaRPr>
@@ -6625,62 +6807,50 @@
           <a:p>
             <a:pPr lvl="0"/>
             <a:r>
-              <a:rPr lang="" altLang="en-US"/>
-              <a:t>Python and numpy</a:t>
-            </a:r>
-            <a:endParaRPr lang="" altLang="en-US"/>
+              <a:rPr lang="en-US" altLang="en-US"/>
+              <a:t>Python</a:t>
+            </a:r>
+            <a:endParaRPr lang="en-US" altLang="en-US"/>
           </a:p>
           <a:p>
             <a:pPr lvl="0"/>
-            <a:endParaRPr lang="" altLang="en-US"/>
+            <a:endParaRPr lang="en-US" altLang="en-US"/>
           </a:p>
           <a:p>
             <a:pPr lvl="0"/>
             <a:r>
-              <a:rPr lang="" altLang="en-US"/>
+              <a:rPr lang="en-US" altLang="en-US"/>
               <a:t>Can take advantage of numpy</a:t>
             </a:r>
-            <a:endParaRPr lang="" altLang="en-US"/>
+            <a:endParaRPr lang="en-US" altLang="en-US"/>
           </a:p>
           <a:p>
             <a:pPr lvl="1"/>
             <a:r>
-              <a:rPr lang="" altLang="en-US"/>
+              <a:rPr lang="en-US" altLang="en-US"/>
               <a:t>Automatically uses multi threading for floating point values</a:t>
             </a:r>
-            <a:endParaRPr lang="" altLang="en-US"/>
+            <a:endParaRPr lang="en-US" altLang="en-US"/>
           </a:p>
           <a:p>
             <a:pPr lvl="1"/>
             <a:r>
-              <a:rPr lang="" altLang="en-US"/>
+              <a:rPr lang="en-US" altLang="en-US"/>
               <a:t>Need to manually implement multi threading for integer values</a:t>
             </a:r>
-            <a:endParaRPr lang="" altLang="en-US"/>
+            <a:endParaRPr lang="en-US" altLang="en-US"/>
           </a:p>
           <a:p>
             <a:pPr lvl="1"/>
-            <a:endParaRPr lang="" altLang="en-US"/>
+            <a:endParaRPr lang="en-US" altLang="en-US"/>
           </a:p>
           <a:p>
             <a:pPr lvl="0"/>
             <a:r>
-              <a:rPr lang="" altLang="en-US"/>
+              <a:rPr lang="en-US" altLang="en-US"/>
               <a:t>Python is very popular with ML, and scientiic work because of its ease of use</a:t>
             </a:r>
-            <a:endParaRPr lang="" altLang="en-US"/>
-          </a:p>
-          <a:p>
-            <a:pPr lvl="0"/>
-            <a:endParaRPr lang="" altLang="en-US"/>
-          </a:p>
-          <a:p>
-            <a:pPr lvl="0"/>
-            <a:r>
-              <a:rPr lang="" altLang="en-US"/>
-              <a:t>Libraries, Libraries, Libraries, and more Libraries</a:t>
-            </a:r>
-            <a:endParaRPr lang="" altLang="en-US"/>
+            <a:endParaRPr lang="en-US" altLang="en-US"/>
           </a:p>
         </p:txBody>
       </p:sp>
@@ -6717,13 +6887,13 @@
           <a:bodyPr/>
           <a:p>
             <a:r>
-              <a:rPr lang="" altLang="en-US" sz="4000">
+              <a:rPr lang="en-US" altLang="en-US" sz="4000">
                 <a:latin typeface="+mn-lt"/>
                 <a:cs typeface="+mn-lt"/>
               </a:rPr>
               <a:t>Initial Communication Design</a:t>
             </a:r>
-            <a:endParaRPr lang="" altLang="en-US" sz="4000">
+            <a:endParaRPr lang="en-US" altLang="en-US" sz="4000">
               <a:latin typeface="+mn-lt"/>
               <a:cs typeface="+mn-lt"/>
             </a:endParaRPr>
@@ -6751,70 +6921,70 @@
           <a:p>
             <a:pPr lvl="1"/>
             <a:r>
-              <a:rPr lang="" altLang="en-US"/>
-              <a:t>Provide a class with interface to perform matrix multiplication with distributed systems</a:t>
-            </a:r>
-            <a:endParaRPr lang="" altLang="en-US"/>
+              <a:rPr lang="en-US" altLang="en-US"/>
+              <a:t>Initially the main Node sends the task request to the worker node</a:t>
+            </a:r>
+            <a:endParaRPr lang="en-US" altLang="en-US"/>
           </a:p>
           <a:p>
             <a:pPr lvl="1"/>
-            <a:endParaRPr lang="" altLang="en-US"/>
+            <a:endParaRPr lang="en-US" altLang="en-US"/>
           </a:p>
           <a:p>
             <a:pPr lvl="1"/>
             <a:r>
-              <a:rPr lang="" altLang="en-US"/>
-              <a:t>Initially the main Node sends the task request to the worker node</a:t>
-            </a:r>
-            <a:endParaRPr lang="" altLang="en-US"/>
+              <a:rPr lang="en-US" altLang="en-US"/>
+              <a:t>The worker node confirms it by returning the message</a:t>
+            </a:r>
+            <a:endParaRPr lang="en-US" altLang="en-US"/>
           </a:p>
           <a:p>
             <a:pPr lvl="1"/>
-            <a:endParaRPr lang="" altLang="en-US"/>
+            <a:endParaRPr lang="en-US" altLang="en-US"/>
           </a:p>
           <a:p>
             <a:pPr lvl="1"/>
             <a:r>
-              <a:rPr lang="" altLang="en-US"/>
-              <a:t>The worker node confirms it by returning the message</a:t>
-            </a:r>
-            <a:endParaRPr lang="" altLang="en-US"/>
+              <a:rPr lang="en-US" altLang="en-US"/>
+              <a:t>Main node sends matrix data to worker</a:t>
+            </a:r>
+            <a:endParaRPr lang="en-US" altLang="en-US"/>
+          </a:p>
+          <a:p>
+            <a:pPr lvl="2"/>
+            <a:r>
+              <a:rPr lang="en-US" altLang="en-US"/>
+              <a:t>No guarentee of data integrity yet</a:t>
+            </a:r>
+            <a:endParaRPr lang="en-US" altLang="en-US"/>
+          </a:p>
+          <a:p>
+            <a:pPr lvl="2"/>
+            <a:endParaRPr lang="en-US" altLang="en-US"/>
           </a:p>
           <a:p>
             <a:pPr lvl="1"/>
-            <a:endParaRPr lang="" altLang="en-US"/>
+            <a:r>
+              <a:rPr lang="en-US" altLang="en-US" sz="1800"/>
+              <a:t>Worker confirms receipt of appropriate dimensions of matrix data</a:t>
+            </a:r>
+            <a:endParaRPr lang="en-US" altLang="en-US" sz="1800"/>
           </a:p>
           <a:p>
             <a:pPr lvl="1"/>
-            <a:r>
-              <a:rPr lang="" altLang="en-US"/>
-              <a:t>Main node sends matrix data to worker</a:t>
-            </a:r>
-            <a:endParaRPr lang="" altLang="en-US"/>
+            <a:endParaRPr lang="en-US" altLang="en-US" sz="1800"/>
+          </a:p>
+          <a:p>
+            <a:pPr lvl="1"/>
+            <a:r>
+              <a:rPr lang="" altLang="en-US" sz="1800"/>
+              <a:t>Worker sends results</a:t>
+            </a:r>
+            <a:endParaRPr lang="en-US" altLang="en-US"/>
           </a:p>
           <a:p>
             <a:pPr lvl="2"/>
-            <a:r>
-              <a:rPr lang="" altLang="en-US"/>
-              <a:t>No guarentee of data integrity yet</a:t>
-            </a:r>
-            <a:endParaRPr lang="" altLang="en-US"/>
-          </a:p>
-          <a:p>
-            <a:pPr lvl="2"/>
-            <a:endParaRPr lang="" altLang="en-US"/>
-          </a:p>
-          <a:p>
-            <a:pPr lvl="1"/>
-            <a:r>
-              <a:rPr lang="" altLang="en-US" sz="1800"/>
-              <a:t>Worker confirms receipt of appropriate dimensions of matrix data</a:t>
-            </a:r>
-            <a:endParaRPr lang="" altLang="en-US"/>
-          </a:p>
-          <a:p>
-            <a:pPr lvl="2"/>
-            <a:endParaRPr lang="" altLang="en-US"/>
+            <a:endParaRPr lang="en-US" altLang="en-US"/>
           </a:p>
         </p:txBody>
       </p:sp>
@@ -6875,13 +7045,13 @@
           <a:bodyPr/>
           <a:p>
             <a:r>
-              <a:rPr lang="" altLang="en-US" sz="4000">
+              <a:rPr lang="en-US" altLang="en-US" sz="4000">
                 <a:latin typeface="+mn-lt"/>
                 <a:cs typeface="+mn-lt"/>
               </a:rPr>
               <a:t>Premilinary analysis metrics</a:t>
             </a:r>
-            <a:endParaRPr lang="" altLang="en-US" sz="4000">
+            <a:endParaRPr lang="en-US" altLang="en-US" sz="4000">
               <a:latin typeface="+mn-lt"/>
               <a:cs typeface="+mn-lt"/>
             </a:endParaRPr>
@@ -6909,14 +7079,14 @@
           <a:p>
             <a:pPr lvl="1"/>
             <a:r>
-              <a:rPr lang="" altLang="en-US">
+              <a:rPr lang="en-US" altLang="en-US">
                 <a:solidFill>
                   <a:srgbClr val="FF0000"/>
                 </a:solidFill>
               </a:rPr>
               <a:t>Measured time for to send and confirm task</a:t>
             </a:r>
-            <a:endParaRPr lang="" altLang="en-US">
+            <a:endParaRPr lang="en-US" altLang="en-US">
               <a:solidFill>
                 <a:srgbClr val="FF0000"/>
               </a:solidFill>
@@ -6925,30 +7095,30 @@
           <a:p>
             <a:pPr lvl="2"/>
             <a:r>
-              <a:rPr lang="" altLang="en-US" sz="1600">
+              <a:rPr lang="en-US" altLang="en-US" sz="1600">
                 <a:solidFill>
                   <a:srgbClr val="FF0000"/>
                 </a:solidFill>
               </a:rPr>
               <a:t>Insignificant</a:t>
             </a:r>
-            <a:endParaRPr lang="" altLang="en-US" sz="1600"/>
+            <a:endParaRPr lang="en-US" altLang="en-US" sz="1600"/>
           </a:p>
           <a:p>
             <a:pPr lvl="1"/>
-            <a:endParaRPr lang="" altLang="en-US"/>
+            <a:endParaRPr lang="en-US" altLang="en-US"/>
           </a:p>
           <a:p>
             <a:pPr lvl="1"/>
             <a:r>
-              <a:rPr lang="" altLang="en-US">
+              <a:rPr lang="en-US" altLang="en-US">
                 <a:solidFill>
                   <a:srgbClr val="00B050"/>
                 </a:solidFill>
               </a:rPr>
               <a:t>Measure time to send data</a:t>
             </a:r>
-            <a:endParaRPr lang="" altLang="en-US">
+            <a:endParaRPr lang="en-US" altLang="en-US">
               <a:solidFill>
                 <a:srgbClr val="00B050"/>
               </a:solidFill>
@@ -6957,14 +7127,14 @@
           <a:p>
             <a:pPr lvl="2"/>
             <a:r>
-              <a:rPr lang="" altLang="en-US">
+              <a:rPr lang="en-US" altLang="en-US">
                 <a:solidFill>
                   <a:srgbClr val="00B050"/>
                 </a:solidFill>
               </a:rPr>
               <a:t>Uncompressed</a:t>
             </a:r>
-            <a:endParaRPr lang="" altLang="en-US">
+            <a:endParaRPr lang="en-US" altLang="en-US">
               <a:solidFill>
                 <a:srgbClr val="00B050"/>
               </a:solidFill>
@@ -6973,44 +7143,30 @@
           <a:p>
             <a:pPr lvl="2"/>
             <a:r>
-              <a:rPr lang="" altLang="en-US">
+              <a:rPr lang="en-US" altLang="en-US">
                 <a:solidFill>
                   <a:srgbClr val="00B050"/>
                 </a:solidFill>
               </a:rPr>
               <a:t>Compressed (high &amp; low bandwidth)</a:t>
             </a:r>
-            <a:endParaRPr lang="" altLang="en-US"/>
-          </a:p>
-          <a:p>
-            <a:pPr marL="914400" lvl="2" indent="0">
-              <a:buNone/>
-            </a:pPr>
-            <a:endParaRPr lang="" altLang="en-US"/>
+            <a:endParaRPr lang="en-US" altLang="en-US"/>
+          </a:p>
+          <a:p>
+            <a:pPr lvl="2"/>
+            <a:endParaRPr lang="en-US" altLang="en-US"/>
           </a:p>
           <a:p>
             <a:pPr lvl="1"/>
             <a:r>
-              <a:rPr lang="" altLang="en-US"/>
-              <a:t>Measure time to compute results on worker node</a:t>
-            </a:r>
-            <a:endParaRPr lang="" altLang="en-US"/>
-          </a:p>
-          <a:p>
-            <a:pPr lvl="2"/>
-            <a:endParaRPr lang="" altLang="en-US"/>
-          </a:p>
-          <a:p>
-            <a:pPr lvl="1"/>
-            <a:r>
-              <a:rPr lang="" altLang="en-US">
+              <a:rPr lang="en-US" altLang="en-US">
                 <a:solidFill>
                   <a:srgbClr val="0070C0"/>
                 </a:solidFill>
               </a:rPr>
               <a:t>Measure time to send results</a:t>
             </a:r>
-            <a:endParaRPr lang="" altLang="en-US">
+            <a:endParaRPr lang="en-US" altLang="en-US">
               <a:solidFill>
                 <a:srgbClr val="0070C0"/>
               </a:solidFill>
@@ -7019,14 +7175,14 @@
           <a:p>
             <a:pPr lvl="2"/>
             <a:r>
-              <a:rPr lang="" altLang="en-US">
+              <a:rPr lang="en-US" altLang="en-US">
                 <a:solidFill>
                   <a:srgbClr val="0070C0"/>
                 </a:solidFill>
               </a:rPr>
               <a:t>Uncompressed</a:t>
             </a:r>
-            <a:endParaRPr lang="" altLang="en-US">
+            <a:endParaRPr lang="en-US" altLang="en-US">
               <a:solidFill>
                 <a:srgbClr val="0070C0"/>
               </a:solidFill>
@@ -7035,7 +7191,7 @@
           <a:p>
             <a:pPr lvl="2"/>
             <a:r>
-              <a:rPr lang="" altLang="en-US">
+              <a:rPr lang="en-US" altLang="en-US">
                 <a:solidFill>
                   <a:srgbClr val="0070C0"/>
                 </a:solidFill>
@@ -7281,13 +7437,13 @@
           <a:bodyPr/>
           <a:p>
             <a:r>
-              <a:rPr lang="" altLang="en-US" sz="4000">
+              <a:rPr lang="en-US" altLang="en-US" sz="4000">
                 <a:latin typeface="+mn-lt"/>
                 <a:cs typeface="+mn-lt"/>
               </a:rPr>
               <a:t>Findings</a:t>
             </a:r>
-            <a:endParaRPr lang="" altLang="en-US" sz="4000">
+            <a:endParaRPr lang="en-US" altLang="en-US" sz="4000">
               <a:latin typeface="+mn-lt"/>
               <a:cs typeface="+mn-lt"/>
             </a:endParaRPr>
@@ -7316,70 +7472,78 @@
           </a:bodyPr>
           <a:p>
             <a:r>
+              <a:rPr lang="en-US" altLang="en-US"/>
+              <a:t>Google Cloud Compute Engine VM’s</a:t>
+            </a:r>
+            <a:endParaRPr lang="en-US" altLang="en-US"/>
+          </a:p>
+          <a:p>
+            <a:pPr lvl="1"/>
+            <a:r>
+              <a:rPr lang="en-US" altLang="en-US"/>
+              <a:t>4 virtual cores @ 2GHz</a:t>
+            </a:r>
+            <a:endParaRPr lang="en-US" altLang="en-US"/>
+          </a:p>
+          <a:p>
+            <a:pPr lvl="1"/>
+            <a:r>
+              <a:rPr lang="en-US" altLang="en-US"/>
+              <a:t>16GB ram</a:t>
+            </a:r>
+            <a:endParaRPr lang="en-US" altLang="en-US"/>
+          </a:p>
+          <a:p>
+            <a:pPr lvl="1"/>
+            <a:endParaRPr lang="en-US" altLang="en-US"/>
+          </a:p>
+          <a:p>
+            <a:pPr lvl="0"/>
+            <a:r>
+              <a:rPr lang="en-US" altLang="en-US"/>
+              <a:t>The compression </a:t>
+            </a:r>
+            <a:r>
               <a:rPr lang="" altLang="en-US"/>
-              <a:t>Google Cloud Compute Engine VM’s</a:t>
-            </a:r>
-            <a:endParaRPr lang="" altLang="en-US"/>
+              <a:t>benifits</a:t>
+            </a:r>
+            <a:r>
+              <a:rPr lang="en-US" altLang="en-US"/>
+              <a:t> are ~10x</a:t>
+            </a:r>
+            <a:endParaRPr lang="en-US" altLang="en-US"/>
+          </a:p>
+          <a:p>
+            <a:pPr lvl="0"/>
+            <a:endParaRPr lang="en-US" altLang="en-US"/>
+          </a:p>
+          <a:p>
+            <a:pPr lvl="0"/>
+            <a:r>
+              <a:rPr lang="en-US" altLang="en-US"/>
+              <a:t>The overall time benifit is ~6x</a:t>
+            </a:r>
+            <a:endParaRPr lang="en-US" altLang="en-US"/>
           </a:p>
           <a:p>
             <a:pPr lvl="1"/>
             <a:r>
-              <a:rPr lang="" altLang="en-US"/>
-              <a:t>4 virtual cores @ 2GHz</a:t>
-            </a:r>
-            <a:endParaRPr lang="" altLang="en-US"/>
+              <a:rPr lang="en-US" altLang="en-US"/>
+              <a:t>Compressing the data takes up some time</a:t>
+            </a:r>
+            <a:endParaRPr lang="en-US" altLang="en-US"/>
           </a:p>
           <a:p>
             <a:pPr lvl="1"/>
-            <a:r>
-              <a:rPr lang="" altLang="en-US"/>
-              <a:t>16GB ram</a:t>
-            </a:r>
-            <a:endParaRPr lang="" altLang="en-US"/>
-          </a:p>
-          <a:p>
-            <a:pPr lvl="1"/>
-            <a:endParaRPr lang="" altLang="en-US"/>
+            <a:endParaRPr lang="en-US" altLang="en-US"/>
           </a:p>
           <a:p>
             <a:pPr lvl="0"/>
             <a:r>
-              <a:rPr lang="" altLang="en-US"/>
-              <a:t>The the compression benigits are ~10x</a:t>
-            </a:r>
-            <a:endParaRPr lang="" altLang="en-US"/>
-          </a:p>
-          <a:p>
-            <a:pPr lvl="0"/>
-            <a:endParaRPr lang="" altLang="en-US"/>
-          </a:p>
-          <a:p>
-            <a:pPr lvl="0"/>
-            <a:r>
-              <a:rPr lang="" altLang="en-US"/>
-              <a:t>The overall time benifit is ~6x</a:t>
-            </a:r>
-            <a:endParaRPr lang="" altLang="en-US"/>
-          </a:p>
-          <a:p>
-            <a:pPr lvl="1"/>
-            <a:r>
-              <a:rPr lang="" altLang="en-US"/>
-              <a:t>Compressing the data takes up some time</a:t>
-            </a:r>
-            <a:endParaRPr lang="" altLang="en-US"/>
-          </a:p>
-          <a:p>
-            <a:pPr lvl="1"/>
-            <a:endParaRPr lang="" altLang="en-US"/>
-          </a:p>
-          <a:p>
-            <a:pPr lvl="0"/>
-            <a:r>
-              <a:rPr lang="" altLang="en-US"/>
+              <a:rPr lang="en-US" altLang="en-US"/>
               <a:t>Something to further consider is how will larger number of splitting affect benifits of compressing data</a:t>
             </a:r>
-            <a:endParaRPr lang="" altLang="en-US"/>
+            <a:endParaRPr lang="en-US" altLang="en-US"/>
           </a:p>
         </p:txBody>
       </p:sp>
@@ -7472,23 +7636,23 @@
           </a:bodyPr>
           <a:p>
             <a:r>
-              <a:rPr lang="" altLang="en-US"/>
+              <a:rPr lang="en-US" altLang="en-US"/>
               <a:t>The compute time in oragne is lower because</a:t>
             </a:r>
-            <a:endParaRPr lang="" altLang="en-US"/>
+            <a:endParaRPr lang="en-US" altLang="en-US"/>
           </a:p>
           <a:p>
             <a:pPr lvl="1"/>
             <a:r>
-              <a:rPr lang="" altLang="en-US" sz="1800"/>
+              <a:rPr lang="en-US" altLang="en-US" sz="1800"/>
               <a:t>My laptop has a higher clock speed</a:t>
             </a:r>
-            <a:endParaRPr lang="" altLang="en-US" sz="1800"/>
+            <a:endParaRPr lang="en-US" altLang="en-US" sz="1800"/>
           </a:p>
           <a:p>
             <a:pPr lvl="2"/>
             <a:r>
-              <a:rPr lang="" altLang="en-US" sz="1600"/>
+              <a:rPr lang="en-US" altLang="en-US" sz="1600"/>
               <a:t>3.4GHz compared to 2GHz</a:t>
             </a:r>
             <a:endParaRPr lang="en-US" altLang="en-US"/>
@@ -7500,15 +7664,15 @@
           <a:p>
             <a:pPr lvl="0"/>
             <a:r>
-              <a:rPr lang="" altLang="en-US"/>
+              <a:rPr lang="en-US" altLang="en-US"/>
               <a:t>All computation were utilizing all 4 cores thanks to numpy.matmult()</a:t>
             </a:r>
-            <a:endParaRPr lang="" altLang="en-US"/>
+            <a:endParaRPr lang="en-US" altLang="en-US"/>
           </a:p>
           <a:p>
             <a:pPr lvl="1"/>
             <a:r>
-              <a:rPr lang="" altLang="en-US" sz="1800"/>
+              <a:rPr lang="en-US" altLang="en-US" sz="1800"/>
               <a:t>Only for floating point values</a:t>
             </a:r>
             <a:endParaRPr lang="en-US" altLang="en-US"/>
@@ -7571,18 +7735,23 @@
             <p:ph type="title"/>
           </p:nvPr>
         </p:nvSpPr>
-        <p:spPr/>
+        <p:spPr>
+          <a:xfrm>
+            <a:off x="410845" y="116205"/>
+            <a:ext cx="4869180" cy="999490"/>
+          </a:xfrm>
+        </p:spPr>
         <p:txBody>
           <a:bodyPr/>
           <a:p>
             <a:r>
-              <a:rPr lang="" sz="4000">
+              <a:rPr lang="" altLang="en-US" sz="4000">
                 <a:latin typeface="+mn-lt"/>
                 <a:cs typeface="+mn-lt"/>
               </a:rPr>
-              <a:t>Whats Next?</a:t>
-            </a:r>
-            <a:endParaRPr lang="" sz="4000">
+              <a:t>The Numbers</a:t>
+            </a:r>
+            <a:endParaRPr lang="" altLang="en-US" sz="4000">
               <a:latin typeface="+mn-lt"/>
               <a:cs typeface="+mn-lt"/>
             </a:endParaRPr>
@@ -7599,51 +7768,1083 @@
             <p:ph idx="1"/>
           </p:nvPr>
         </p:nvSpPr>
-        <p:spPr/>
+        <p:spPr>
+          <a:xfrm>
+            <a:off x="320675" y="1055370"/>
+            <a:ext cx="7971790" cy="5586095"/>
+          </a:xfrm>
+        </p:spPr>
         <p:txBody>
-          <a:bodyPr/>
+          <a:bodyPr>
+            <a:normAutofit/>
+          </a:bodyPr>
+          <a:p>
+            <a:pPr marL="0" lvl="0" indent="0">
+              <a:buNone/>
+            </a:pPr>
+            <a:r>
+              <a:rPr lang="" altLang="en-US" sz="1800"/>
+              <a:t>For (8000,8000)x</a:t>
+            </a:r>
+            <a:r>
+              <a:rPr lang="en-US" altLang="en-US" sz="1800">
+                <a:sym typeface="+mn-ea"/>
+              </a:rPr>
+              <a:t>(8000,8000)</a:t>
+            </a:r>
+            <a:r>
+              <a:rPr lang="" altLang="en-US" sz="1800"/>
+              <a:t> matrix multiplication: Split into 4 subtasks</a:t>
+            </a:r>
+            <a:endParaRPr lang="" altLang="en-US" sz="1800"/>
+          </a:p>
+          <a:p>
+            <a:pPr lvl="0"/>
+            <a:r>
+              <a:rPr lang="en-US" altLang="en-US" sz="1800">
+                <a:sym typeface="+mn-ea"/>
+              </a:rPr>
+              <a:t>Time to compute on single node ~15s</a:t>
+            </a:r>
+            <a:endParaRPr lang="" altLang="en-US" sz="1800"/>
+          </a:p>
+          <a:p>
+            <a:pPr lvl="0"/>
+            <a:r>
+              <a:rPr lang="" altLang="en-US" sz="1800"/>
+              <a:t>Time to send all the data: ~8s</a:t>
+            </a:r>
+            <a:endParaRPr lang="" altLang="en-US" sz="1800"/>
+          </a:p>
+          <a:p>
+            <a:pPr lvl="0"/>
+            <a:r>
+              <a:rPr lang="" altLang="en-US" sz="1800"/>
+              <a:t>Time to compute (4000,8000)x(8</a:t>
+            </a:r>
+            <a:r>
+              <a:rPr lang="en-US" altLang="en-US" sz="1800">
+                <a:sym typeface="+mn-ea"/>
+              </a:rPr>
+              <a:t>000,</a:t>
+            </a:r>
+            <a:r>
+              <a:rPr lang="" altLang="en-US" sz="1800">
+                <a:sym typeface="+mn-ea"/>
+              </a:rPr>
+              <a:t>4</a:t>
+            </a:r>
+            <a:r>
+              <a:rPr lang="en-US" altLang="en-US" sz="1800">
+                <a:sym typeface="+mn-ea"/>
+              </a:rPr>
+              <a:t>000)</a:t>
+            </a:r>
+            <a:r>
+              <a:rPr lang="" altLang="en-US" sz="1800"/>
+              <a:t>: ~3s</a:t>
+            </a:r>
+            <a:endParaRPr lang="" altLang="en-US" sz="1800"/>
+          </a:p>
+          <a:p>
+            <a:pPr lvl="0"/>
+            <a:r>
+              <a:rPr lang="" altLang="en-US" sz="1800"/>
+              <a:t>Time to retrieve results: ~4s</a:t>
+            </a:r>
+            <a:endParaRPr lang="" altLang="en-US" sz="1800"/>
+          </a:p>
+          <a:p>
+            <a:pPr marL="0" lvl="0" indent="0">
+              <a:buNone/>
+            </a:pPr>
+            <a:r>
+              <a:rPr lang="" altLang="en-US" sz="1600"/>
+              <a:t>		</a:t>
+            </a:r>
+            <a:r>
+              <a:rPr lang="" altLang="en-US" sz="1800" b="1"/>
+              <a:t>Total </a:t>
+            </a:r>
+            <a:r>
+              <a:rPr lang="en-US" altLang="en-US" sz="1800" b="1">
+                <a:sym typeface="+mn-ea"/>
+              </a:rPr>
+              <a:t>Savings </a:t>
+            </a:r>
+            <a:r>
+              <a:rPr lang="" altLang="en-US" sz="1800" b="1"/>
+              <a:t>= 15 - (8 + 3 + 4) = 0s</a:t>
+            </a:r>
+            <a:endParaRPr lang="" altLang="en-US" sz="1800" b="1"/>
+          </a:p>
+          <a:p>
+            <a:pPr marL="0" lvl="0" indent="0">
+              <a:buNone/>
+            </a:pPr>
+            <a:endParaRPr lang="" altLang="en-US" sz="1600"/>
+          </a:p>
+          <a:p>
+            <a:pPr marL="0" lvl="0" indent="0">
+              <a:buNone/>
+            </a:pPr>
+            <a:r>
+              <a:rPr lang="en-US" altLang="en-US" sz="1800">
+                <a:sym typeface="+mn-ea"/>
+              </a:rPr>
+              <a:t>For (</a:t>
+            </a:r>
+            <a:r>
+              <a:rPr lang="" altLang="en-US" sz="1800">
+                <a:sym typeface="+mn-ea"/>
+              </a:rPr>
+              <a:t>16</a:t>
+            </a:r>
+            <a:r>
+              <a:rPr lang="en-US" altLang="en-US" sz="1800">
+                <a:sym typeface="+mn-ea"/>
+              </a:rPr>
+              <a:t>000,</a:t>
+            </a:r>
+            <a:r>
+              <a:rPr lang="" altLang="en-US" sz="1800">
+                <a:sym typeface="+mn-ea"/>
+              </a:rPr>
+              <a:t>16</a:t>
+            </a:r>
+            <a:r>
+              <a:rPr lang="en-US" altLang="en-US" sz="1800">
+                <a:sym typeface="+mn-ea"/>
+              </a:rPr>
+              <a:t>000)</a:t>
+            </a:r>
+            <a:r>
+              <a:rPr lang="" altLang="en-US" sz="1800">
+                <a:sym typeface="+mn-ea"/>
+              </a:rPr>
+              <a:t>x</a:t>
+            </a:r>
+            <a:r>
+              <a:rPr lang="en-US" altLang="en-US" sz="1800">
+                <a:sym typeface="+mn-ea"/>
+              </a:rPr>
+              <a:t>(16000,16000)</a:t>
+            </a:r>
+            <a:r>
+              <a:rPr lang="en-US" altLang="en-US" sz="1800">
+                <a:sym typeface="+mn-ea"/>
+              </a:rPr>
+              <a:t> matrix multiplication: Split into 4 subtasks</a:t>
+            </a:r>
+            <a:endParaRPr lang="en-US" altLang="en-US" sz="1800"/>
+          </a:p>
+          <a:p>
+            <a:pPr lvl="0"/>
+            <a:r>
+              <a:rPr lang="en-US" altLang="en-US" sz="1800">
+                <a:sym typeface="+mn-ea"/>
+              </a:rPr>
+              <a:t>Time to compute on single node ~</a:t>
+            </a:r>
+            <a:r>
+              <a:rPr lang="" altLang="en-US" sz="1800">
+                <a:sym typeface="+mn-ea"/>
+              </a:rPr>
+              <a:t>120</a:t>
+            </a:r>
+            <a:r>
+              <a:rPr lang="en-US" altLang="en-US" sz="1800">
+                <a:sym typeface="+mn-ea"/>
+              </a:rPr>
+              <a:t>s</a:t>
+            </a:r>
+            <a:endParaRPr lang="en-US" altLang="en-US" sz="1800"/>
+          </a:p>
+          <a:p>
+            <a:pPr lvl="0"/>
+            <a:r>
+              <a:rPr lang="en-US" altLang="en-US" sz="1800">
+                <a:sym typeface="+mn-ea"/>
+              </a:rPr>
+              <a:t>Time to send all the data: ~</a:t>
+            </a:r>
+            <a:r>
+              <a:rPr lang="" altLang="en-US" sz="1800">
+                <a:sym typeface="+mn-ea"/>
+              </a:rPr>
+              <a:t>34</a:t>
+            </a:r>
+            <a:r>
+              <a:rPr lang="en-US" altLang="en-US" sz="1800">
+                <a:sym typeface="+mn-ea"/>
+              </a:rPr>
+              <a:t>s</a:t>
+            </a:r>
+            <a:endParaRPr lang="en-US" altLang="en-US" sz="1800"/>
+          </a:p>
+          <a:p>
+            <a:pPr lvl="0"/>
+            <a:r>
+              <a:rPr lang="en-US" altLang="en-US" sz="1800">
+                <a:sym typeface="+mn-ea"/>
+              </a:rPr>
+              <a:t>Time to compute </a:t>
+            </a:r>
+            <a:r>
+              <a:rPr lang="" altLang="en-US" sz="1800">
+                <a:sym typeface="+mn-ea"/>
+              </a:rPr>
+              <a:t>(8</a:t>
+            </a:r>
+            <a:r>
+              <a:rPr lang="en-US" altLang="en-US" sz="1800">
+                <a:sym typeface="+mn-ea"/>
+              </a:rPr>
+              <a:t>000</a:t>
+            </a:r>
+            <a:r>
+              <a:rPr lang="" altLang="en-US" sz="1800">
+                <a:sym typeface="+mn-ea"/>
+              </a:rPr>
+              <a:t>,16</a:t>
+            </a:r>
+            <a:r>
+              <a:rPr lang="en-US" altLang="en-US" sz="1800">
+                <a:sym typeface="+mn-ea"/>
+              </a:rPr>
+              <a:t>000</a:t>
+            </a:r>
+            <a:r>
+              <a:rPr lang="" altLang="en-US" sz="1800">
+                <a:sym typeface="+mn-ea"/>
+              </a:rPr>
+              <a:t>)x</a:t>
+            </a:r>
+            <a:r>
+              <a:rPr lang="en-US" altLang="en-US" sz="1800">
+                <a:sym typeface="+mn-ea"/>
+              </a:rPr>
+              <a:t>(</a:t>
+            </a:r>
+            <a:r>
+              <a:rPr lang="" altLang="en-US" sz="1800">
+                <a:sym typeface="+mn-ea"/>
+              </a:rPr>
+              <a:t>16</a:t>
+            </a:r>
+            <a:r>
+              <a:rPr lang="en-US" altLang="en-US" sz="1800">
+                <a:sym typeface="+mn-ea"/>
+              </a:rPr>
+              <a:t>000,</a:t>
+            </a:r>
+            <a:r>
+              <a:rPr lang="" altLang="en-US" sz="1800">
+                <a:sym typeface="+mn-ea"/>
+              </a:rPr>
+              <a:t>8</a:t>
+            </a:r>
+            <a:r>
+              <a:rPr lang="en-US" altLang="en-US" sz="1800">
+                <a:sym typeface="+mn-ea"/>
+              </a:rPr>
+              <a:t>000)</a:t>
+            </a:r>
+            <a:r>
+              <a:rPr lang="en-US" altLang="en-US" sz="1800">
+                <a:sym typeface="+mn-ea"/>
+              </a:rPr>
+              <a:t>: ~</a:t>
+            </a:r>
+            <a:r>
+              <a:rPr lang="" altLang="en-US" sz="1800">
+                <a:sym typeface="+mn-ea"/>
+              </a:rPr>
+              <a:t>20</a:t>
+            </a:r>
+            <a:r>
+              <a:rPr lang="en-US" altLang="en-US" sz="1800">
+                <a:sym typeface="+mn-ea"/>
+              </a:rPr>
+              <a:t>s</a:t>
+            </a:r>
+            <a:endParaRPr lang="en-US" altLang="en-US" sz="1800"/>
+          </a:p>
+          <a:p>
+            <a:pPr lvl="0"/>
+            <a:r>
+              <a:rPr lang="en-US" altLang="en-US" sz="1800">
+                <a:sym typeface="+mn-ea"/>
+              </a:rPr>
+              <a:t>Time to retrieve results: ~</a:t>
+            </a:r>
+            <a:r>
+              <a:rPr lang="" altLang="en-US" sz="1800">
+                <a:sym typeface="+mn-ea"/>
+              </a:rPr>
+              <a:t>18</a:t>
+            </a:r>
+            <a:r>
+              <a:rPr lang="en-US" altLang="en-US" sz="1800">
+                <a:sym typeface="+mn-ea"/>
+              </a:rPr>
+              <a:t>s</a:t>
+            </a:r>
+            <a:endParaRPr lang="en-US" altLang="en-US" sz="1800"/>
+          </a:p>
+          <a:p>
+            <a:pPr lvl="0"/>
+            <a:endParaRPr lang="en-US" altLang="en-US" sz="1800"/>
+          </a:p>
+          <a:p>
+            <a:pPr marL="0" lvl="0" indent="0">
+              <a:buNone/>
+            </a:pPr>
+            <a:r>
+              <a:rPr lang="" altLang="en-US" sz="1800">
+                <a:sym typeface="+mn-ea"/>
+              </a:rPr>
+              <a:t>		</a:t>
+            </a:r>
+            <a:r>
+              <a:rPr lang="en-US" altLang="en-US" sz="1800" b="1">
+                <a:sym typeface="+mn-ea"/>
+              </a:rPr>
+              <a:t>Total </a:t>
+            </a:r>
+            <a:r>
+              <a:rPr lang="" altLang="en-US" sz="1800" b="1">
+                <a:sym typeface="+mn-ea"/>
+              </a:rPr>
+              <a:t>Savings </a:t>
+            </a:r>
+            <a:r>
+              <a:rPr lang="en-US" altLang="en-US" sz="1800" b="1">
+                <a:sym typeface="+mn-ea"/>
+              </a:rPr>
+              <a:t>= </a:t>
+            </a:r>
+            <a:r>
+              <a:rPr lang="" altLang="en-US" sz="1800" b="1">
+                <a:sym typeface="+mn-ea"/>
+              </a:rPr>
+              <a:t>120</a:t>
+            </a:r>
+            <a:r>
+              <a:rPr lang="en-US" altLang="en-US" sz="1800" b="1">
+                <a:sym typeface="+mn-ea"/>
+              </a:rPr>
+              <a:t> - (</a:t>
+            </a:r>
+            <a:r>
+              <a:rPr lang="" altLang="en-US" sz="1800" b="1">
+                <a:sym typeface="+mn-ea"/>
+              </a:rPr>
+              <a:t>34</a:t>
+            </a:r>
+            <a:r>
+              <a:rPr lang="en-US" altLang="en-US" sz="1800" b="1">
+                <a:sym typeface="+mn-ea"/>
+              </a:rPr>
+              <a:t> + </a:t>
+            </a:r>
+            <a:r>
+              <a:rPr lang="" altLang="en-US" sz="1800" b="1">
+                <a:sym typeface="+mn-ea"/>
+              </a:rPr>
+              <a:t>20</a:t>
+            </a:r>
+            <a:r>
+              <a:rPr lang="en-US" altLang="en-US" sz="1800" b="1">
+                <a:sym typeface="+mn-ea"/>
+              </a:rPr>
+              <a:t> + </a:t>
+            </a:r>
+            <a:r>
+              <a:rPr lang="" altLang="en-US" sz="1800" b="1">
+                <a:sym typeface="+mn-ea"/>
+              </a:rPr>
+              <a:t>18</a:t>
+            </a:r>
+            <a:r>
+              <a:rPr lang="en-US" altLang="en-US" sz="1800" b="1">
+                <a:sym typeface="+mn-ea"/>
+              </a:rPr>
+              <a:t>) = </a:t>
+            </a:r>
+            <a:r>
+              <a:rPr lang="" altLang="en-US" sz="1800" b="1">
+                <a:sym typeface="+mn-ea"/>
+              </a:rPr>
+              <a:t>48</a:t>
+            </a:r>
+            <a:r>
+              <a:rPr lang="en-US" altLang="en-US" sz="1800" b="1">
+                <a:sym typeface="+mn-ea"/>
+              </a:rPr>
+              <a:t>s</a:t>
+            </a:r>
+            <a:endParaRPr lang="" altLang="en-US" sz="1800" b="1"/>
+          </a:p>
+        </p:txBody>
+      </p:sp>
+      <p:grpSp>
+        <p:nvGrpSpPr>
+          <p:cNvPr id="12" name="Group 11"/>
+          <p:cNvGrpSpPr/>
+          <p:nvPr/>
+        </p:nvGrpSpPr>
+        <p:grpSpPr>
+          <a:xfrm>
+            <a:off x="7694295" y="985520"/>
+            <a:ext cx="1878330" cy="1878330"/>
+            <a:chOff x="12117" y="1552"/>
+            <a:chExt cx="2958" cy="2958"/>
+          </a:xfrm>
+        </p:grpSpPr>
+        <p:sp>
+          <p:nvSpPr>
+            <p:cNvPr id="8" name="Rectangle 7"/>
+            <p:cNvSpPr/>
+            <p:nvPr/>
+          </p:nvSpPr>
+          <p:spPr>
+            <a:xfrm>
+              <a:off x="12117" y="1552"/>
+              <a:ext cx="1479" cy="1479"/>
+            </a:xfrm>
+            <a:prstGeom prst="rect">
+              <a:avLst/>
+            </a:prstGeom>
+            <a:noFill/>
+            <a:extLst>
+              <a:ext uri="{909E8E84-426E-40DD-AFC4-6F175D3DCCD1}">
+                <a14:hiddenFill xmlns:a14="http://schemas.microsoft.com/office/drawing/2010/main">
+                  <a:solidFill>
+                    <a:srgbClr val="FF3300"/>
+                  </a:solidFill>
+                </a14:hiddenFill>
+              </a:ext>
+            </a:extLst>
+          </p:spPr>
+          <p:style>
+            <a:lnRef idx="2">
+              <a:schemeClr val="accent2">
+                <a:shade val="50000"/>
+              </a:schemeClr>
+            </a:lnRef>
+            <a:fillRef idx="1">
+              <a:schemeClr val="accent2"/>
+            </a:fillRef>
+            <a:effectRef idx="0">
+              <a:schemeClr val="accent2"/>
+            </a:effectRef>
+            <a:fontRef idx="minor">
+              <a:schemeClr val="lt1"/>
+            </a:fontRef>
+          </p:style>
+          <p:txBody>
+            <a:bodyPr rtlCol="0" anchor="ctr"/>
+            <a:p>
+              <a:pPr algn="ctr"/>
+              <a:endParaRPr lang="en-US"/>
+            </a:p>
+          </p:txBody>
+        </p:sp>
+        <p:sp>
+          <p:nvSpPr>
+            <p:cNvPr id="9" name="Rectangle 8"/>
+            <p:cNvSpPr/>
+            <p:nvPr/>
+          </p:nvSpPr>
+          <p:spPr>
+            <a:xfrm>
+              <a:off x="13596" y="1552"/>
+              <a:ext cx="1479" cy="1479"/>
+            </a:xfrm>
+            <a:prstGeom prst="rect">
+              <a:avLst/>
+            </a:prstGeom>
+            <a:noFill/>
+            <a:extLst>
+              <a:ext uri="{909E8E84-426E-40DD-AFC4-6F175D3DCCD1}">
+                <a14:hiddenFill xmlns:a14="http://schemas.microsoft.com/office/drawing/2010/main">
+                  <a:solidFill>
+                    <a:schemeClr val="accent1"/>
+                  </a:solidFill>
+                </a14:hiddenFill>
+              </a:ext>
+            </a:extLst>
+          </p:spPr>
+          <p:style>
+            <a:lnRef idx="2">
+              <a:schemeClr val="accent1">
+                <a:shade val="50000"/>
+              </a:schemeClr>
+            </a:lnRef>
+            <a:fillRef idx="1">
+              <a:schemeClr val="accent1"/>
+            </a:fillRef>
+            <a:effectRef idx="0">
+              <a:schemeClr val="accent1"/>
+            </a:effectRef>
+            <a:fontRef idx="minor">
+              <a:schemeClr val="lt1"/>
+            </a:fontRef>
+          </p:style>
+          <p:txBody>
+            <a:bodyPr rtlCol="0" anchor="ctr"/>
+            <a:p>
+              <a:pPr algn="ctr"/>
+              <a:endParaRPr lang="en-US"/>
+            </a:p>
+          </p:txBody>
+        </p:sp>
+        <p:sp>
+          <p:nvSpPr>
+            <p:cNvPr id="10" name="Rectangle 9"/>
+            <p:cNvSpPr/>
+            <p:nvPr/>
+          </p:nvSpPr>
+          <p:spPr>
+            <a:xfrm>
+              <a:off x="12117" y="3031"/>
+              <a:ext cx="1479" cy="1479"/>
+            </a:xfrm>
+            <a:prstGeom prst="rect">
+              <a:avLst/>
+            </a:prstGeom>
+            <a:noFill/>
+            <a:extLst>
+              <a:ext uri="{909E8E84-426E-40DD-AFC4-6F175D3DCCD1}">
+                <a14:hiddenFill xmlns:a14="http://schemas.microsoft.com/office/drawing/2010/main">
+                  <a:solidFill>
+                    <a:schemeClr val="accent6"/>
+                  </a:solidFill>
+                </a14:hiddenFill>
+              </a:ext>
+            </a:extLst>
+          </p:spPr>
+          <p:style>
+            <a:lnRef idx="2">
+              <a:schemeClr val="accent4">
+                <a:shade val="50000"/>
+              </a:schemeClr>
+            </a:lnRef>
+            <a:fillRef idx="1">
+              <a:schemeClr val="accent4"/>
+            </a:fillRef>
+            <a:effectRef idx="0">
+              <a:schemeClr val="accent4"/>
+            </a:effectRef>
+            <a:fontRef idx="minor">
+              <a:schemeClr val="lt1"/>
+            </a:fontRef>
+          </p:style>
+          <p:txBody>
+            <a:bodyPr rtlCol="0" anchor="ctr"/>
+            <a:p>
+              <a:pPr algn="ctr"/>
+              <a:endParaRPr lang="en-US"/>
+            </a:p>
+          </p:txBody>
+        </p:sp>
+        <p:sp>
+          <p:nvSpPr>
+            <p:cNvPr id="11" name="Rectangle 10"/>
+            <p:cNvSpPr/>
+            <p:nvPr/>
+          </p:nvSpPr>
+          <p:spPr>
+            <a:xfrm>
+              <a:off x="13596" y="3031"/>
+              <a:ext cx="1479" cy="1479"/>
+            </a:xfrm>
+            <a:prstGeom prst="rect">
+              <a:avLst/>
+            </a:prstGeom>
+            <a:noFill/>
+            <a:extLst>
+              <a:ext uri="{909E8E84-426E-40DD-AFC4-6F175D3DCCD1}">
+                <a14:hiddenFill xmlns:a14="http://schemas.microsoft.com/office/drawing/2010/main">
+                  <a:solidFill>
+                    <a:schemeClr val="accent4"/>
+                  </a:solidFill>
+                </a14:hiddenFill>
+              </a:ext>
+            </a:extLst>
+          </p:spPr>
+          <p:style>
+            <a:lnRef idx="2">
+              <a:schemeClr val="accent6">
+                <a:shade val="50000"/>
+              </a:schemeClr>
+            </a:lnRef>
+            <a:fillRef idx="1">
+              <a:schemeClr val="accent6"/>
+            </a:fillRef>
+            <a:effectRef idx="0">
+              <a:schemeClr val="accent6"/>
+            </a:effectRef>
+            <a:fontRef idx="minor">
+              <a:schemeClr val="lt1"/>
+            </a:fontRef>
+          </p:style>
+          <p:txBody>
+            <a:bodyPr rtlCol="0" anchor="ctr"/>
+            <a:p>
+              <a:pPr algn="ctr"/>
+              <a:endParaRPr lang="en-US"/>
+            </a:p>
+          </p:txBody>
+        </p:sp>
+      </p:grpSp>
+      <p:grpSp>
+        <p:nvGrpSpPr>
+          <p:cNvPr id="23" name="Group 22"/>
+          <p:cNvGrpSpPr/>
+          <p:nvPr/>
+        </p:nvGrpSpPr>
+        <p:grpSpPr>
+          <a:xfrm>
+            <a:off x="9906000" y="985520"/>
+            <a:ext cx="1878330" cy="1878330"/>
+            <a:chOff x="12117" y="1552"/>
+            <a:chExt cx="2958" cy="2958"/>
+          </a:xfrm>
+        </p:grpSpPr>
+        <p:sp>
+          <p:nvSpPr>
+            <p:cNvPr id="24" name="Rectangle 23"/>
+            <p:cNvSpPr/>
+            <p:nvPr/>
+          </p:nvSpPr>
+          <p:spPr>
+            <a:xfrm>
+              <a:off x="12117" y="1552"/>
+              <a:ext cx="1479" cy="1479"/>
+            </a:xfrm>
+            <a:prstGeom prst="rect">
+              <a:avLst/>
+            </a:prstGeom>
+            <a:noFill/>
+            <a:extLst>
+              <a:ext uri="{909E8E84-426E-40DD-AFC4-6F175D3DCCD1}">
+                <a14:hiddenFill xmlns:a14="http://schemas.microsoft.com/office/drawing/2010/main">
+                  <a:solidFill>
+                    <a:srgbClr val="FF3300"/>
+                  </a:solidFill>
+                </a14:hiddenFill>
+              </a:ext>
+            </a:extLst>
+          </p:spPr>
+          <p:style>
+            <a:lnRef idx="2">
+              <a:schemeClr val="accent2">
+                <a:shade val="50000"/>
+              </a:schemeClr>
+            </a:lnRef>
+            <a:fillRef idx="1">
+              <a:schemeClr val="accent2"/>
+            </a:fillRef>
+            <a:effectRef idx="0">
+              <a:schemeClr val="accent2"/>
+            </a:effectRef>
+            <a:fontRef idx="minor">
+              <a:schemeClr val="lt1"/>
+            </a:fontRef>
+          </p:style>
+          <p:txBody>
+            <a:bodyPr rtlCol="0" anchor="ctr"/>
+            <a:p>
+              <a:pPr algn="ctr"/>
+              <a:endParaRPr lang="en-US"/>
+            </a:p>
+          </p:txBody>
+        </p:sp>
+        <p:sp>
+          <p:nvSpPr>
+            <p:cNvPr id="25" name="Rectangle 24"/>
+            <p:cNvSpPr/>
+            <p:nvPr/>
+          </p:nvSpPr>
+          <p:spPr>
+            <a:xfrm>
+              <a:off x="13596" y="1552"/>
+              <a:ext cx="1479" cy="1479"/>
+            </a:xfrm>
+            <a:prstGeom prst="rect">
+              <a:avLst/>
+            </a:prstGeom>
+            <a:noFill/>
+            <a:extLst>
+              <a:ext uri="{909E8E84-426E-40DD-AFC4-6F175D3DCCD1}">
+                <a14:hiddenFill xmlns:a14="http://schemas.microsoft.com/office/drawing/2010/main">
+                  <a:solidFill>
+                    <a:schemeClr val="accent1"/>
+                  </a:solidFill>
+                </a14:hiddenFill>
+              </a:ext>
+            </a:extLst>
+          </p:spPr>
+          <p:style>
+            <a:lnRef idx="2">
+              <a:schemeClr val="accent1">
+                <a:shade val="50000"/>
+              </a:schemeClr>
+            </a:lnRef>
+            <a:fillRef idx="1">
+              <a:schemeClr val="accent1"/>
+            </a:fillRef>
+            <a:effectRef idx="0">
+              <a:schemeClr val="accent1"/>
+            </a:effectRef>
+            <a:fontRef idx="minor">
+              <a:schemeClr val="lt1"/>
+            </a:fontRef>
+          </p:style>
+          <p:txBody>
+            <a:bodyPr rtlCol="0" anchor="ctr"/>
+            <a:p>
+              <a:pPr algn="ctr"/>
+              <a:endParaRPr lang="en-US"/>
+            </a:p>
+          </p:txBody>
+        </p:sp>
+        <p:sp>
+          <p:nvSpPr>
+            <p:cNvPr id="26" name="Rectangle 25"/>
+            <p:cNvSpPr/>
+            <p:nvPr/>
+          </p:nvSpPr>
+          <p:spPr>
+            <a:xfrm>
+              <a:off x="12117" y="3031"/>
+              <a:ext cx="1479" cy="1479"/>
+            </a:xfrm>
+            <a:prstGeom prst="rect">
+              <a:avLst/>
+            </a:prstGeom>
+            <a:noFill/>
+            <a:extLst>
+              <a:ext uri="{909E8E84-426E-40DD-AFC4-6F175D3DCCD1}">
+                <a14:hiddenFill xmlns:a14="http://schemas.microsoft.com/office/drawing/2010/main">
+                  <a:solidFill>
+                    <a:schemeClr val="accent6"/>
+                  </a:solidFill>
+                </a14:hiddenFill>
+              </a:ext>
+            </a:extLst>
+          </p:spPr>
+          <p:style>
+            <a:lnRef idx="2">
+              <a:schemeClr val="accent4">
+                <a:shade val="50000"/>
+              </a:schemeClr>
+            </a:lnRef>
+            <a:fillRef idx="1">
+              <a:schemeClr val="accent4"/>
+            </a:fillRef>
+            <a:effectRef idx="0">
+              <a:schemeClr val="accent4"/>
+            </a:effectRef>
+            <a:fontRef idx="minor">
+              <a:schemeClr val="lt1"/>
+            </a:fontRef>
+          </p:style>
+          <p:txBody>
+            <a:bodyPr rtlCol="0" anchor="ctr"/>
+            <a:p>
+              <a:pPr algn="ctr"/>
+              <a:endParaRPr lang="en-US"/>
+            </a:p>
+          </p:txBody>
+        </p:sp>
+        <p:sp>
+          <p:nvSpPr>
+            <p:cNvPr id="27" name="Rectangle 26"/>
+            <p:cNvSpPr/>
+            <p:nvPr/>
+          </p:nvSpPr>
+          <p:spPr>
+            <a:xfrm>
+              <a:off x="13596" y="3031"/>
+              <a:ext cx="1479" cy="1479"/>
+            </a:xfrm>
+            <a:prstGeom prst="rect">
+              <a:avLst/>
+            </a:prstGeom>
+            <a:noFill/>
+            <a:extLst>
+              <a:ext uri="{909E8E84-426E-40DD-AFC4-6F175D3DCCD1}">
+                <a14:hiddenFill xmlns:a14="http://schemas.microsoft.com/office/drawing/2010/main">
+                  <a:solidFill>
+                    <a:schemeClr val="accent4"/>
+                  </a:solidFill>
+                </a14:hiddenFill>
+              </a:ext>
+            </a:extLst>
+          </p:spPr>
+          <p:style>
+            <a:lnRef idx="2">
+              <a:schemeClr val="accent6">
+                <a:shade val="50000"/>
+              </a:schemeClr>
+            </a:lnRef>
+            <a:fillRef idx="1">
+              <a:schemeClr val="accent6"/>
+            </a:fillRef>
+            <a:effectRef idx="0">
+              <a:schemeClr val="accent6"/>
+            </a:effectRef>
+            <a:fontRef idx="minor">
+              <a:schemeClr val="lt1"/>
+            </a:fontRef>
+          </p:style>
+          <p:txBody>
+            <a:bodyPr rtlCol="0" anchor="ctr"/>
+            <a:p>
+              <a:pPr algn="ctr"/>
+              <a:endParaRPr lang="en-US"/>
+            </a:p>
+          </p:txBody>
+        </p:sp>
+      </p:grpSp>
+      <p:grpSp>
+        <p:nvGrpSpPr>
+          <p:cNvPr id="28" name="Group 27"/>
+          <p:cNvGrpSpPr/>
+          <p:nvPr/>
+        </p:nvGrpSpPr>
+        <p:grpSpPr>
+          <a:xfrm>
+            <a:off x="8834755" y="3246120"/>
+            <a:ext cx="1878330" cy="1878330"/>
+            <a:chOff x="12117" y="1552"/>
+            <a:chExt cx="2958" cy="2958"/>
+          </a:xfrm>
+        </p:grpSpPr>
+        <p:sp>
+          <p:nvSpPr>
+            <p:cNvPr id="29" name="Rectangle 28"/>
+            <p:cNvSpPr/>
+            <p:nvPr/>
+          </p:nvSpPr>
+          <p:spPr>
+            <a:xfrm>
+              <a:off x="12117" y="1552"/>
+              <a:ext cx="1479" cy="1479"/>
+            </a:xfrm>
+            <a:prstGeom prst="rect">
+              <a:avLst/>
+            </a:prstGeom>
+            <a:noFill/>
+            <a:extLst>
+              <a:ext uri="{909E8E84-426E-40DD-AFC4-6F175D3DCCD1}">
+                <a14:hiddenFill xmlns:a14="http://schemas.microsoft.com/office/drawing/2010/main">
+                  <a:solidFill>
+                    <a:srgbClr val="FF3300"/>
+                  </a:solidFill>
+                </a14:hiddenFill>
+              </a:ext>
+            </a:extLst>
+          </p:spPr>
+          <p:style>
+            <a:lnRef idx="2">
+              <a:schemeClr val="accent2">
+                <a:shade val="50000"/>
+              </a:schemeClr>
+            </a:lnRef>
+            <a:fillRef idx="1">
+              <a:schemeClr val="accent2"/>
+            </a:fillRef>
+            <a:effectRef idx="0">
+              <a:schemeClr val="accent2"/>
+            </a:effectRef>
+            <a:fontRef idx="minor">
+              <a:schemeClr val="lt1"/>
+            </a:fontRef>
+          </p:style>
+          <p:txBody>
+            <a:bodyPr rtlCol="0" anchor="ctr"/>
+            <a:p>
+              <a:pPr algn="ctr"/>
+              <a:endParaRPr lang="en-US"/>
+            </a:p>
+          </p:txBody>
+        </p:sp>
+        <p:sp>
+          <p:nvSpPr>
+            <p:cNvPr id="30" name="Rectangle 29"/>
+            <p:cNvSpPr/>
+            <p:nvPr/>
+          </p:nvSpPr>
+          <p:spPr>
+            <a:xfrm>
+              <a:off x="13596" y="1552"/>
+              <a:ext cx="1479" cy="1479"/>
+            </a:xfrm>
+            <a:prstGeom prst="rect">
+              <a:avLst/>
+            </a:prstGeom>
+            <a:noFill/>
+            <a:extLst>
+              <a:ext uri="{909E8E84-426E-40DD-AFC4-6F175D3DCCD1}">
+                <a14:hiddenFill xmlns:a14="http://schemas.microsoft.com/office/drawing/2010/main">
+                  <a:solidFill>
+                    <a:schemeClr val="accent1"/>
+                  </a:solidFill>
+                </a14:hiddenFill>
+              </a:ext>
+            </a:extLst>
+          </p:spPr>
+          <p:style>
+            <a:lnRef idx="2">
+              <a:schemeClr val="accent1">
+                <a:shade val="50000"/>
+              </a:schemeClr>
+            </a:lnRef>
+            <a:fillRef idx="1">
+              <a:schemeClr val="accent1"/>
+            </a:fillRef>
+            <a:effectRef idx="0">
+              <a:schemeClr val="accent1"/>
+            </a:effectRef>
+            <a:fontRef idx="minor">
+              <a:schemeClr val="lt1"/>
+            </a:fontRef>
+          </p:style>
+          <p:txBody>
+            <a:bodyPr rtlCol="0" anchor="ctr"/>
+            <a:p>
+              <a:pPr algn="ctr"/>
+              <a:endParaRPr lang="en-US"/>
+            </a:p>
+          </p:txBody>
+        </p:sp>
+        <p:sp>
+          <p:nvSpPr>
+            <p:cNvPr id="31" name="Rectangle 30"/>
+            <p:cNvSpPr/>
+            <p:nvPr/>
+          </p:nvSpPr>
+          <p:spPr>
+            <a:xfrm>
+              <a:off x="12117" y="3031"/>
+              <a:ext cx="1479" cy="1479"/>
+            </a:xfrm>
+            <a:prstGeom prst="rect">
+              <a:avLst/>
+            </a:prstGeom>
+            <a:noFill/>
+            <a:extLst>
+              <a:ext uri="{909E8E84-426E-40DD-AFC4-6F175D3DCCD1}">
+                <a14:hiddenFill xmlns:a14="http://schemas.microsoft.com/office/drawing/2010/main">
+                  <a:solidFill>
+                    <a:schemeClr val="accent6"/>
+                  </a:solidFill>
+                </a14:hiddenFill>
+              </a:ext>
+            </a:extLst>
+          </p:spPr>
+          <p:style>
+            <a:lnRef idx="2">
+              <a:schemeClr val="accent4">
+                <a:shade val="50000"/>
+              </a:schemeClr>
+            </a:lnRef>
+            <a:fillRef idx="1">
+              <a:schemeClr val="accent4"/>
+            </a:fillRef>
+            <a:effectRef idx="0">
+              <a:schemeClr val="accent4"/>
+            </a:effectRef>
+            <a:fontRef idx="minor">
+              <a:schemeClr val="lt1"/>
+            </a:fontRef>
+          </p:style>
+          <p:txBody>
+            <a:bodyPr rtlCol="0" anchor="ctr"/>
+            <a:p>
+              <a:pPr algn="ctr"/>
+              <a:endParaRPr lang="en-US"/>
+            </a:p>
+          </p:txBody>
+        </p:sp>
+        <p:sp>
+          <p:nvSpPr>
+            <p:cNvPr id="32" name="Rectangle 31"/>
+            <p:cNvSpPr/>
+            <p:nvPr/>
+          </p:nvSpPr>
+          <p:spPr>
+            <a:xfrm>
+              <a:off x="13596" y="3031"/>
+              <a:ext cx="1479" cy="1479"/>
+            </a:xfrm>
+            <a:prstGeom prst="rect">
+              <a:avLst/>
+            </a:prstGeom>
+            <a:noFill/>
+            <a:extLst>
+              <a:ext uri="{909E8E84-426E-40DD-AFC4-6F175D3DCCD1}">
+                <a14:hiddenFill xmlns:a14="http://schemas.microsoft.com/office/drawing/2010/main">
+                  <a:solidFill>
+                    <a:schemeClr val="accent4"/>
+                  </a:solidFill>
+                </a14:hiddenFill>
+              </a:ext>
+            </a:extLst>
+          </p:spPr>
+          <p:style>
+            <a:lnRef idx="2">
+              <a:schemeClr val="accent6">
+                <a:shade val="50000"/>
+              </a:schemeClr>
+            </a:lnRef>
+            <a:fillRef idx="1">
+              <a:schemeClr val="accent6"/>
+            </a:fillRef>
+            <a:effectRef idx="0">
+              <a:schemeClr val="accent6"/>
+            </a:effectRef>
+            <a:fontRef idx="minor">
+              <a:schemeClr val="lt1"/>
+            </a:fontRef>
+          </p:style>
+          <p:txBody>
+            <a:bodyPr rtlCol="0" anchor="ctr"/>
+            <a:p>
+              <a:pPr algn="ctr"/>
+              <a:endParaRPr lang="en-US"/>
+            </a:p>
+          </p:txBody>
+        </p:sp>
+      </p:grpSp>
+      <p:sp>
+        <p:nvSpPr>
+          <p:cNvPr id="33" name="Text Box 32"/>
+          <p:cNvSpPr txBox="true"/>
+          <p:nvPr/>
+        </p:nvSpPr>
+        <p:spPr>
+          <a:xfrm>
+            <a:off x="9596755" y="1792605"/>
+            <a:ext cx="230505" cy="368300"/>
+          </a:xfrm>
+          <a:prstGeom prst="rect">
+            <a:avLst/>
+          </a:prstGeom>
+          <a:noFill/>
+        </p:spPr>
+        <p:txBody>
+          <a:bodyPr wrap="square" rtlCol="0">
+            <a:spAutoFit/>
+          </a:bodyPr>
           <a:p>
             <a:r>
               <a:rPr lang="" altLang="en-US"/>
-              <a:t>Collect data on the same metrics with multiple workers</a:t>
-            </a:r>
-            <a:endParaRPr lang="" altLang="en-US"/>
-          </a:p>
-          <a:p>
-            <a:pPr lvl="1"/>
-            <a:r>
-              <a:rPr lang="" altLang="en-US"/>
-              <a:t>Multi-threaded approach on main node already implemented (Just need to collect data)</a:t>
-            </a:r>
-            <a:endParaRPr lang="" altLang="en-US"/>
-          </a:p>
-          <a:p>
-            <a:endParaRPr lang="" altLang="en-US"/>
-          </a:p>
-          <a:p>
-            <a:r>
-              <a:rPr lang="" altLang="en-US"/>
-              <a:t>Implement re-offloading with for failed nodes</a:t>
-            </a:r>
-            <a:endParaRPr lang="" altLang="en-US"/>
-          </a:p>
-          <a:p>
-            <a:endParaRPr lang="" altLang="en-US"/>
-          </a:p>
-          <a:p>
-            <a:r>
-              <a:rPr lang="" altLang="en-US"/>
-              <a:t>Analyze the time savings</a:t>
-            </a:r>
-            <a:endParaRPr lang="" altLang="en-US"/>
-          </a:p>
-          <a:p>
-            <a:endParaRPr lang="" altLang="en-US"/>
-          </a:p>
-          <a:p>
-            <a:r>
-              <a:rPr lang="" altLang="en-US"/>
-              <a:t>Analyze the max node failure amount before loss of computation advantage</a:t>
+              <a:t>x</a:t>
             </a:r>
             <a:endParaRPr lang="" altLang="en-US"/>
           </a:p>
@@ -7677,46 +8878,85 @@
             <p:ph type="title"/>
           </p:nvPr>
         </p:nvSpPr>
-        <p:spPr>
-          <a:xfrm>
-            <a:off x="4147185" y="2597150"/>
-            <a:ext cx="3752850" cy="1374140"/>
-          </a:xfrm>
-        </p:spPr>
+        <p:spPr/>
         <p:txBody>
           <a:bodyPr/>
           <a:p>
             <a:r>
-              <a:rPr lang="en-US" altLang="en-US" sz="5400">
-                <a:solidFill>
-                  <a:schemeClr val="tx1"/>
-                </a:solidFill>
-                <a:effectLst>
-                  <a:outerShdw blurRad="38100" dist="19050" dir="2700000" algn="tl" rotWithShape="0">
-                    <a:schemeClr val="dk1">
-                      <a:alpha val="40000"/>
-                    </a:schemeClr>
-                  </a:outerShdw>
-                </a:effectLst>
+              <a:rPr lang="en-US" sz="4000">
                 <a:latin typeface="+mn-lt"/>
                 <a:cs typeface="+mn-lt"/>
               </a:rPr>
-              <a:t>Questions</a:t>
-            </a:r>
-            <a:endParaRPr lang="en-US" altLang="en-US" sz="5400">
-              <a:solidFill>
-                <a:schemeClr val="tx1"/>
-              </a:solidFill>
-              <a:effectLst>
-                <a:outerShdw blurRad="38100" dist="19050" dir="2700000" algn="tl" rotWithShape="0">
-                  <a:schemeClr val="dk1">
-                    <a:alpha val="40000"/>
-                  </a:schemeClr>
-                </a:outerShdw>
-              </a:effectLst>
+              <a:t>Whats Next?</a:t>
+            </a:r>
+            <a:endParaRPr lang="en-US" sz="4000">
               <a:latin typeface="+mn-lt"/>
               <a:cs typeface="+mn-lt"/>
             </a:endParaRPr>
+          </a:p>
+        </p:txBody>
+      </p:sp>
+      <p:sp>
+        <p:nvSpPr>
+          <p:cNvPr id="3" name="Content Placeholder 2"/>
+          <p:cNvSpPr>
+            <a:spLocks noGrp="true"/>
+          </p:cNvSpPr>
+          <p:nvPr>
+            <p:ph idx="1"/>
+          </p:nvPr>
+        </p:nvSpPr>
+        <p:spPr/>
+        <p:txBody>
+          <a:bodyPr/>
+          <a:p>
+            <a:r>
+              <a:rPr lang="en-US" altLang="en-US"/>
+              <a:t>Collect </a:t>
+            </a:r>
+            <a:r>
+              <a:rPr lang="" altLang="en-US"/>
+              <a:t>more data/metrics</a:t>
+            </a:r>
+            <a:endParaRPr lang="en-US" altLang="en-US"/>
+          </a:p>
+          <a:p>
+            <a:pPr lvl="1"/>
+            <a:r>
+              <a:rPr lang="en-US" altLang="en-US"/>
+              <a:t>Multi-threaded approach on main node already implemented (Just need to collect data)</a:t>
+            </a:r>
+            <a:endParaRPr lang="en-US" altLang="en-US"/>
+          </a:p>
+          <a:p>
+            <a:endParaRPr lang="en-US" altLang="en-US"/>
+          </a:p>
+          <a:p>
+            <a:r>
+              <a:rPr lang="en-US" altLang="en-US"/>
+              <a:t>Implement re-offloading with for failed nodes</a:t>
+            </a:r>
+            <a:endParaRPr lang="en-US" altLang="en-US"/>
+          </a:p>
+          <a:p>
+            <a:endParaRPr lang="en-US" altLang="en-US"/>
+          </a:p>
+          <a:p>
+            <a:r>
+              <a:rPr lang="en-US" altLang="en-US"/>
+              <a:t>Analyze the time savings</a:t>
+            </a:r>
+            <a:endParaRPr lang="en-US" altLang="en-US"/>
+          </a:p>
+          <a:p>
+            <a:endParaRPr lang="en-US" altLang="en-US"/>
+          </a:p>
+          <a:p>
+            <a:r>
+              <a:rPr lang="en-US" altLang="en-US"/>
+              <a:t>Analyze the max node failure amount before loss of computation advantage</a:t>
+            </a:r>
+            <a:endParaRPr lang="en-US" altLang="en-US"/>
           </a:p>
         </p:txBody>
       </p:sp>

</xml_diff>